<commit_message>
Added probabilities to GUI output
</commit_message>
<xml_diff>
--- a/Deploying Machine Learning APIs with Python.pptx
+++ b/Deploying Machine Learning APIs with Python.pptx
@@ -626,7 +626,7 @@
           <a:p>
             <a:fld id="{1160EA64-D806-43AC-9DF2-F8C432F32B4C}" type="datetimeFigureOut">
               <a:rPr lang="en-US" smtClean="0"/>
-              <a:t>10/9/2018</a:t>
+              <a:t>10/11/2018</a:t>
             </a:fld>
             <a:endParaRPr lang="en-US" dirty="0"/>
           </a:p>
@@ -923,7 +923,7 @@
           <a:p>
             <a:fld id="{1160EA64-D806-43AC-9DF2-F8C432F32B4C}" type="datetimeFigureOut">
               <a:rPr lang="en-US" smtClean="0"/>
-              <a:t>10/9/2018</a:t>
+              <a:t>10/11/2018</a:t>
             </a:fld>
             <a:endParaRPr lang="en-US" dirty="0"/>
           </a:p>
@@ -1173,7 +1173,7 @@
           <a:p>
             <a:fld id="{1160EA64-D806-43AC-9DF2-F8C432F32B4C}" type="datetimeFigureOut">
               <a:rPr lang="en-US" smtClean="0"/>
-              <a:t>10/9/2018</a:t>
+              <a:t>10/11/2018</a:t>
             </a:fld>
             <a:endParaRPr lang="en-US" dirty="0"/>
           </a:p>
@@ -1715,7 +1715,7 @@
           <a:p>
             <a:fld id="{1160EA64-D806-43AC-9DF2-F8C432F32B4C}" type="datetimeFigureOut">
               <a:rPr lang="en-US" smtClean="0"/>
-              <a:t>10/9/2018</a:t>
+              <a:t>10/11/2018</a:t>
             </a:fld>
             <a:endParaRPr lang="en-US" dirty="0"/>
           </a:p>
@@ -1965,7 +1965,7 @@
           <a:p>
             <a:fld id="{1160EA64-D806-43AC-9DF2-F8C432F32B4C}" type="datetimeFigureOut">
               <a:rPr lang="en-US" smtClean="0"/>
-              <a:t>10/9/2018</a:t>
+              <a:t>10/11/2018</a:t>
             </a:fld>
             <a:endParaRPr lang="en-US" dirty="0"/>
           </a:p>
@@ -2499,7 +2499,7 @@
           <a:p>
             <a:fld id="{1160EA64-D806-43AC-9DF2-F8C432F32B4C}" type="datetimeFigureOut">
               <a:rPr lang="en-US" smtClean="0"/>
-              <a:t>10/9/2018</a:t>
+              <a:t>10/11/2018</a:t>
             </a:fld>
             <a:endParaRPr lang="en-US" dirty="0"/>
           </a:p>
@@ -2798,7 +2798,7 @@
           <a:p>
             <a:fld id="{1160EA64-D806-43AC-9DF2-F8C432F32B4C}" type="datetimeFigureOut">
               <a:rPr lang="en-US" smtClean="0"/>
-              <a:t>10/9/2018</a:t>
+              <a:t>10/11/2018</a:t>
             </a:fld>
             <a:endParaRPr lang="en-US" dirty="0"/>
           </a:p>
@@ -2974,7 +2974,7 @@
           <a:p>
             <a:fld id="{E9F9C37B-1D36-470B-8223-D6C91242EC14}" type="datetimeFigureOut">
               <a:rPr lang="en-US" smtClean="0"/>
-              <a:t>10/9/2018</a:t>
+              <a:t>10/11/2018</a:t>
             </a:fld>
             <a:endParaRPr lang="en-US" dirty="0"/>
           </a:p>
@@ -3154,7 +3154,7 @@
           <a:p>
             <a:fld id="{67C6F52A-A82B-47A2-A83A-8C4C91F2D59F}" type="datetimeFigureOut">
               <a:rPr lang="en-US" smtClean="0"/>
-              <a:t>10/9/2018</a:t>
+              <a:t>10/11/2018</a:t>
             </a:fld>
             <a:endParaRPr lang="en-US" dirty="0"/>
           </a:p>
@@ -3324,7 +3324,7 @@
           <a:p>
             <a:fld id="{F070A7B3-6521-4DCA-87E5-044747A908C1}" type="datetimeFigureOut">
               <a:rPr lang="en-US" smtClean="0"/>
-              <a:t>10/9/2018</a:t>
+              <a:t>10/11/2018</a:t>
             </a:fld>
             <a:endParaRPr lang="en-US" dirty="0"/>
           </a:p>
@@ -3576,7 +3576,7 @@
           <a:p>
             <a:fld id="{1160EA64-D806-43AC-9DF2-F8C432F32B4C}" type="datetimeFigureOut">
               <a:rPr lang="en-US" smtClean="0"/>
-              <a:t>10/9/2018</a:t>
+              <a:t>10/11/2018</a:t>
             </a:fld>
             <a:endParaRPr lang="en-US" dirty="0"/>
           </a:p>
@@ -3874,7 +3874,7 @@
           <a:p>
             <a:fld id="{AB134690-1557-4C89-A502-4959FE7FAD70}" type="datetimeFigureOut">
               <a:rPr lang="en-US" smtClean="0"/>
-              <a:t>10/9/2018</a:t>
+              <a:t>10/11/2018</a:t>
             </a:fld>
             <a:endParaRPr lang="en-US" dirty="0"/>
           </a:p>
@@ -4316,7 +4316,7 @@
           <a:p>
             <a:fld id="{1160EA64-D806-43AC-9DF2-F8C432F32B4C}" type="datetimeFigureOut">
               <a:rPr lang="en-US" smtClean="0"/>
-              <a:t>10/9/2018</a:t>
+              <a:t>10/11/2018</a:t>
             </a:fld>
             <a:endParaRPr lang="en-US" dirty="0"/>
           </a:p>
@@ -4436,7 +4436,7 @@
           <a:p>
             <a:fld id="{E1037C31-9E7A-4F99-8774-A0E530DE1A42}" type="datetimeFigureOut">
               <a:rPr lang="en-US" smtClean="0"/>
-              <a:t>10/9/2018</a:t>
+              <a:t>10/11/2018</a:t>
             </a:fld>
             <a:endParaRPr lang="en-US" dirty="0"/>
           </a:p>
@@ -4531,7 +4531,7 @@
           <a:p>
             <a:fld id="{C278504F-A551-4DE0-9316-4DCD1D8CC752}" type="datetimeFigureOut">
               <a:rPr lang="en-US" smtClean="0"/>
-              <a:t>10/9/2018</a:t>
+              <a:t>10/11/2018</a:t>
             </a:fld>
             <a:endParaRPr lang="en-US" dirty="0"/>
           </a:p>
@@ -4814,7 +4814,7 @@
           <a:p>
             <a:fld id="{1160EA64-D806-43AC-9DF2-F8C432F32B4C}" type="datetimeFigureOut">
               <a:rPr lang="en-US" smtClean="0"/>
-              <a:t>10/9/2018</a:t>
+              <a:t>10/11/2018</a:t>
             </a:fld>
             <a:endParaRPr lang="en-US" dirty="0"/>
           </a:p>
@@ -5106,7 +5106,7 @@
           <a:p>
             <a:fld id="{1160EA64-D806-43AC-9DF2-F8C432F32B4C}" type="datetimeFigureOut">
               <a:rPr lang="en-US" smtClean="0"/>
-              <a:t>10/9/2018</a:t>
+              <a:t>10/11/2018</a:t>
             </a:fld>
             <a:endParaRPr lang="en-US" dirty="0"/>
           </a:p>
@@ -5638,7 +5638,7 @@
           <a:p>
             <a:fld id="{1160EA64-D806-43AC-9DF2-F8C432F32B4C}" type="datetimeFigureOut">
               <a:rPr lang="en-US" smtClean="0"/>
-              <a:t>10/9/2018</a:t>
+              <a:t>10/11/2018</a:t>
             </a:fld>
             <a:endParaRPr lang="en-US" dirty="0"/>
           </a:p>
@@ -6748,13 +6748,8 @@
           <a:p>
             <a:r>
               <a:rPr lang="en-US" dirty="0" smtClean="0"/>
-              <a:t>This </a:t>
-            </a:r>
-            <a:r>
-              <a:rPr lang="en-US" dirty="0" smtClean="0"/>
-              <a:t>talk was only about deploying machine learning models, not about how to build a good model. </a:t>
-            </a:r>
-            <a:endParaRPr lang="en-US" dirty="0" smtClean="0"/>
+              <a:t>This talk was only about deploying machine learning models, not about how to build a good model. </a:t>
+            </a:r>
           </a:p>
           <a:p>
             <a:endParaRPr lang="en-US" dirty="0" smtClean="0"/>
@@ -6778,11 +6773,7 @@
             </a:r>
             <a:r>
               <a:rPr lang="en-US" dirty="0" smtClean="0"/>
-              <a:t> </a:t>
-            </a:r>
-            <a:r>
-              <a:rPr lang="en-US" dirty="0" smtClean="0"/>
-              <a:t>files can break with different versions of </a:t>
+              <a:t> files can break with different versions of </a:t>
             </a:r>
             <a:r>
               <a:rPr lang="en-US" dirty="0" err="1" smtClean="0"/>
@@ -6799,11 +6790,7 @@
           <a:p>
             <a:r>
               <a:rPr lang="en-US" dirty="0" smtClean="0"/>
-              <a:t>Code </a:t>
-            </a:r>
-            <a:r>
-              <a:rPr lang="en-US" dirty="0" smtClean="0"/>
-              <a:t>was built in a simplistic way for pedagogical purposes. For actual production, use appropriate software engineering practices.</a:t>
+              <a:t>Code was built in a simplistic way for pedagogical purposes. For actual production, use appropriate software engineering practices.</a:t>
             </a:r>
           </a:p>
           <a:p>
@@ -6911,7 +6898,7 @@
         </p:nvSpPr>
         <p:spPr>
           <a:xfrm>
-            <a:off x="1484310" y="1482634"/>
+            <a:off x="1484310" y="1325880"/>
             <a:ext cx="10018713" cy="1752599"/>
           </a:xfrm>
         </p:spPr>
@@ -7575,15 +7562,7 @@
           <a:p>
             <a:r>
               <a:rPr lang="en-US" dirty="0" smtClean="0"/>
-              <a:t>Why use </a:t>
-            </a:r>
-            <a:r>
-              <a:rPr lang="en-US" dirty="0" smtClean="0"/>
-              <a:t>a REST </a:t>
-            </a:r>
-            <a:r>
-              <a:rPr lang="en-US" dirty="0" smtClean="0"/>
-              <a:t>API?</a:t>
+              <a:t>Why use a REST API?</a:t>
             </a:r>
           </a:p>
           <a:p>
@@ -7736,15 +7715,7 @@
           <a:p>
             <a:r>
               <a:rPr lang="en-US" dirty="0" smtClean="0"/>
-              <a:t>Why </a:t>
-            </a:r>
-            <a:r>
-              <a:rPr lang="en-US" dirty="0" smtClean="0"/>
-              <a:t>a REST </a:t>
-            </a:r>
-            <a:r>
-              <a:rPr lang="en-US" dirty="0" smtClean="0"/>
-              <a:t>API?</a:t>
+              <a:t>Why a REST API?</a:t>
             </a:r>
             <a:endParaRPr lang="en-US" dirty="0"/>
           </a:p>
@@ -8520,11 +8491,7 @@
           <a:p>
             <a:r>
               <a:rPr lang="en-US" dirty="0" smtClean="0"/>
-              <a:t>Transforms </a:t>
-            </a:r>
-            <a:r>
-              <a:rPr lang="en-US" dirty="0" smtClean="0"/>
-              <a:t>data</a:t>
+              <a:t>Transforms data</a:t>
             </a:r>
           </a:p>
           <a:p>

</xml_diff>